<commit_message>
Added codes to Class 04
</commit_message>
<xml_diff>
--- a/Aula 04/Aula 04.pptx
+++ b/Aula 04/Aula 04.pptx
@@ -113,6 +113,22 @@
       </a:defRPr>
     </a:lvl9pPr>
   </p:defaultTextStyle>
+  <p:extLst>
+    <p:ext uri="{EFAFB233-063F-42B5-8137-9DF3F51BA10A}">
+      <p15:sldGuideLst xmlns:p15="http://schemas.microsoft.com/office/powerpoint/2012/main">
+        <p15:guide id="1" orient="horz" pos="2160">
+          <p15:clr>
+            <a:srgbClr val="A4A3A4"/>
+          </p15:clr>
+        </p15:guide>
+        <p15:guide id="2" pos="2880">
+          <p15:clr>
+            <a:srgbClr val="A4A3A4"/>
+          </p15:clr>
+        </p15:guide>
+      </p15:sldGuideLst>
+    </p:ext>
+  </p:extLst>
 </p:presentation>
 </file>
 
@@ -742,7 +758,7 @@
             <a:fld id="{44542E5C-4956-4943-9DF6-A60BB4F4792B}" type="datetimeFigureOut">
               <a:rPr lang="en-US" smtClean="0"/>
               <a:pPr/>
-              <a:t>9/23/2014</a:t>
+              <a:t>10/6/2014</a:t>
             </a:fld>
             <a:endParaRPr lang="en-US"/>
           </a:p>
@@ -940,7 +956,7 @@
             <a:fld id="{44542E5C-4956-4943-9DF6-A60BB4F4792B}" type="datetimeFigureOut">
               <a:rPr lang="en-US" smtClean="0"/>
               <a:pPr/>
-              <a:t>9/23/2014</a:t>
+              <a:t>10/6/2014</a:t>
             </a:fld>
             <a:endParaRPr lang="en-US"/>
           </a:p>
@@ -1127,7 +1143,7 @@
             <a:fld id="{44542E5C-4956-4943-9DF6-A60BB4F4792B}" type="datetimeFigureOut">
               <a:rPr lang="en-US" smtClean="0"/>
               <a:pPr/>
-              <a:t>9/23/2014</a:t>
+              <a:t>10/6/2014</a:t>
             </a:fld>
             <a:endParaRPr lang="en-US"/>
           </a:p>
@@ -1279,7 +1295,7 @@
             <a:fld id="{44542E5C-4956-4943-9DF6-A60BB4F4792B}" type="datetimeFigureOut">
               <a:rPr lang="en-US" smtClean="0"/>
               <a:pPr/>
-              <a:t>9/23/2014</a:t>
+              <a:t>10/6/2014</a:t>
             </a:fld>
             <a:endParaRPr lang="en-US"/>
           </a:p>
@@ -1536,7 +1552,7 @@
             <a:fld id="{44542E5C-4956-4943-9DF6-A60BB4F4792B}" type="datetimeFigureOut">
               <a:rPr lang="en-US" smtClean="0"/>
               <a:pPr/>
-              <a:t>9/23/2014</a:t>
+              <a:t>10/6/2014</a:t>
             </a:fld>
             <a:endParaRPr lang="en-US"/>
           </a:p>
@@ -1947,7 +1963,7 @@
             <a:fld id="{44542E5C-4956-4943-9DF6-A60BB4F4792B}" type="datetimeFigureOut">
               <a:rPr lang="en-US" smtClean="0"/>
               <a:pPr/>
-              <a:t>9/23/2014</a:t>
+              <a:t>10/6/2014</a:t>
             </a:fld>
             <a:endParaRPr lang="en-US"/>
           </a:p>
@@ -2395,7 +2411,7 @@
             <a:fld id="{44542E5C-4956-4943-9DF6-A60BB4F4792B}" type="datetimeFigureOut">
               <a:rPr lang="en-US" smtClean="0"/>
               <a:pPr/>
-              <a:t>9/23/2014</a:t>
+              <a:t>10/6/2014</a:t>
             </a:fld>
             <a:endParaRPr lang="en-US"/>
           </a:p>
@@ -2498,7 +2514,7 @@
             <a:fld id="{44542E5C-4956-4943-9DF6-A60BB4F4792B}" type="datetimeFigureOut">
               <a:rPr lang="en-US" smtClean="0"/>
               <a:pPr/>
-              <a:t>9/23/2014</a:t>
+              <a:t>10/6/2014</a:t>
             </a:fld>
             <a:endParaRPr lang="en-US"/>
           </a:p>
@@ -2621,7 +2637,7 @@
             <a:fld id="{44542E5C-4956-4943-9DF6-A60BB4F4792B}" type="datetimeFigureOut">
               <a:rPr lang="en-US" smtClean="0"/>
               <a:pPr/>
-              <a:t>9/23/2014</a:t>
+              <a:t>10/6/2014</a:t>
             </a:fld>
             <a:endParaRPr lang="en-US"/>
           </a:p>
@@ -2897,7 +2913,7 @@
             <a:fld id="{44542E5C-4956-4943-9DF6-A60BB4F4792B}" type="datetimeFigureOut">
               <a:rPr lang="en-US" smtClean="0"/>
               <a:pPr/>
-              <a:t>9/23/2014</a:t>
+              <a:t>10/6/2014</a:t>
             </a:fld>
             <a:endParaRPr lang="en-US"/>
           </a:p>
@@ -3104,7 +3120,7 @@
             <a:fld id="{44542E5C-4956-4943-9DF6-A60BB4F4792B}" type="datetimeFigureOut">
               <a:rPr lang="en-US" smtClean="0"/>
               <a:pPr/>
-              <a:t>9/23/2014</a:t>
+              <a:t>10/6/2014</a:t>
             </a:fld>
             <a:endParaRPr lang="en-US"/>
           </a:p>
@@ -4215,7 +4231,7 @@
             <a:fld id="{44542E5C-4956-4943-9DF6-A60BB4F4792B}" type="datetimeFigureOut">
               <a:rPr lang="en-US" smtClean="0"/>
               <a:pPr/>
-              <a:t>9/23/2014</a:t>
+              <a:t>10/6/2014</a:t>
             </a:fld>
             <a:endParaRPr lang="en-US"/>
           </a:p>
@@ -4689,11 +4705,7 @@
             </a:r>
             <a:r>
               <a:rPr lang="en-US" dirty="0" smtClean="0"/>
-              <a:t> </a:t>
-            </a:r>
-            <a:r>
-              <a:rPr lang="en-US" dirty="0" smtClean="0"/>
-              <a:t>o </a:t>
+              <a:t> o </a:t>
             </a:r>
             <a:r>
               <a:rPr lang="en-US" dirty="0" err="1" smtClean="0"/>
@@ -4767,16 +4779,76 @@
           </a:prstGeom>
         </p:spPr>
       </p:pic>
+      <p:sp>
+        <p:nvSpPr>
+          <p:cNvPr id="6" name="Rectangle 5"/>
+          <p:cNvSpPr/>
+          <p:nvPr/>
+        </p:nvSpPr>
+        <p:spPr>
+          <a:xfrm>
+            <a:off x="304290" y="5590608"/>
+            <a:ext cx="4619399" cy="369332"/>
+          </a:xfrm>
+          <a:prstGeom prst="rect">
+            <a:avLst/>
+          </a:prstGeom>
+        </p:spPr>
+        <p:txBody>
+          <a:bodyPr wrap="none">
+            <a:spAutoFit/>
+          </a:bodyPr>
+          <a:lstStyle/>
+          <a:p>
+            <a:r>
+              <a:rPr lang="pt-BR" dirty="0" err="1"/>
+              <a:t>https</a:t>
+            </a:r>
+            <a:r>
+              <a:rPr lang="pt-BR" dirty="0"/>
+              <a:t>://</a:t>
+            </a:r>
+            <a:r>
+              <a:rPr lang="pt-BR" dirty="0" err="1"/>
+              <a:t>github.com</a:t>
+            </a:r>
+            <a:r>
+              <a:rPr lang="pt-BR" dirty="0"/>
+              <a:t>/</a:t>
+            </a:r>
+            <a:r>
+              <a:rPr lang="pt-BR" dirty="0" err="1"/>
+              <a:t>mendelson</a:t>
+            </a:r>
+            <a:r>
+              <a:rPr lang="pt-BR" dirty="0"/>
+              <a:t>/</a:t>
+            </a:r>
+            <a:r>
+              <a:rPr lang="pt-BR" dirty="0" err="1"/>
+              <a:t>edubot</a:t>
+            </a:r>
+            <a:endParaRPr lang="pt-BR" dirty="0"/>
+          </a:p>
+        </p:txBody>
+      </p:sp>
     </p:spTree>
     <p:extLst>
       <p:ext uri="{BB962C8B-B14F-4D97-AF65-F5344CB8AC3E}">
-        <p14:creationId xmlns:p14="http://schemas.microsoft.com/office/powerpoint/2010/main" xmlns="" val="3432375396"/>
+        <p14:creationId xmlns:p14="http://schemas.microsoft.com/office/powerpoint/2010/main" val="3432375396"/>
       </p:ext>
     </p:extLst>
   </p:cSld>
   <p:clrMapOvr>
     <a:masterClrMapping/>
   </p:clrMapOvr>
+  <p:timing>
+    <p:tnLst>
+      <p:par>
+        <p:cTn id="1" dur="indefinite" restart="never" nodeType="tmRoot"/>
+      </p:par>
+    </p:tnLst>
+  </p:timing>
 </p:sld>
 </file>
 
@@ -4970,13 +5042,20 @@
     </p:spTree>
     <p:extLst>
       <p:ext uri="{BB962C8B-B14F-4D97-AF65-F5344CB8AC3E}">
-        <p14:creationId xmlns:p14="http://schemas.microsoft.com/office/powerpoint/2010/main" xmlns="" val="3897530789"/>
+        <p14:creationId xmlns:p14="http://schemas.microsoft.com/office/powerpoint/2010/main" val="3897530789"/>
       </p:ext>
     </p:extLst>
   </p:cSld>
   <p:clrMapOvr>
     <a:masterClrMapping/>
   </p:clrMapOvr>
+  <p:timing>
+    <p:tnLst>
+      <p:par>
+        <p:cTn id="1" dur="indefinite" restart="never" nodeType="tmRoot"/>
+      </p:par>
+    </p:tnLst>
+  </p:timing>
 </p:sld>
 </file>
 
@@ -5011,7 +5090,7 @@
           <a:blip r:embed="rId2">
             <a:extLst>
               <a:ext uri="{28A0092B-C50C-407E-A947-70E740481C1C}">
-                <a14:useLocalDpi xmlns:a14="http://schemas.microsoft.com/office/drawing/2010/main" xmlns="" val="0"/>
+                <a14:useLocalDpi xmlns:a14="http://schemas.microsoft.com/office/drawing/2010/main" val="0"/>
               </a:ext>
             </a:extLst>
           </a:blip>
@@ -5166,13 +5245,20 @@
     </p:spTree>
     <p:extLst>
       <p:ext uri="{BB962C8B-B14F-4D97-AF65-F5344CB8AC3E}">
-        <p14:creationId xmlns:p14="http://schemas.microsoft.com/office/powerpoint/2010/main" xmlns="" val="3019988723"/>
+        <p14:creationId xmlns:p14="http://schemas.microsoft.com/office/powerpoint/2010/main" val="3019988723"/>
       </p:ext>
     </p:extLst>
   </p:cSld>
   <p:clrMapOvr>
     <a:masterClrMapping/>
   </p:clrMapOvr>
+  <p:timing>
+    <p:tnLst>
+      <p:par>
+        <p:cTn id="1" dur="indefinite" restart="never" nodeType="tmRoot"/>
+      </p:par>
+    </p:tnLst>
+  </p:timing>
 </p:sld>
 </file>
 
@@ -5259,7 +5345,7 @@
           <a:blip r:embed="rId2">
             <a:extLst>
               <a:ext uri="{28A0092B-C50C-407E-A947-70E740481C1C}">
-                <a14:useLocalDpi xmlns:a14="http://schemas.microsoft.com/office/drawing/2010/main" xmlns="" val="0"/>
+                <a14:useLocalDpi xmlns:a14="http://schemas.microsoft.com/office/drawing/2010/main" val="0"/>
               </a:ext>
             </a:extLst>
           </a:blip>
@@ -5416,13 +5502,20 @@
     </p:spTree>
     <p:extLst>
       <p:ext uri="{BB962C8B-B14F-4D97-AF65-F5344CB8AC3E}">
-        <p14:creationId xmlns:p14="http://schemas.microsoft.com/office/powerpoint/2010/main" xmlns="" val="1100044674"/>
+        <p14:creationId xmlns:p14="http://schemas.microsoft.com/office/powerpoint/2010/main" val="1100044674"/>
       </p:ext>
     </p:extLst>
   </p:cSld>
   <p:clrMapOvr>
     <a:masterClrMapping/>
   </p:clrMapOvr>
+  <p:timing>
+    <p:tnLst>
+      <p:par>
+        <p:cTn id="1" dur="indefinite" restart="never" nodeType="tmRoot"/>
+      </p:par>
+    </p:tnLst>
+  </p:timing>
 </p:sld>
 </file>
 
@@ -5457,7 +5550,7 @@
           <a:blip r:embed="rId2">
             <a:extLst>
               <a:ext uri="{28A0092B-C50C-407E-A947-70E740481C1C}">
-                <a14:useLocalDpi xmlns:a14="http://schemas.microsoft.com/office/drawing/2010/main" xmlns="" val="0"/>
+                <a14:useLocalDpi xmlns:a14="http://schemas.microsoft.com/office/drawing/2010/main" val="0"/>
               </a:ext>
             </a:extLst>
           </a:blip>
@@ -5525,13 +5618,20 @@
     </p:spTree>
     <p:extLst>
       <p:ext uri="{BB962C8B-B14F-4D97-AF65-F5344CB8AC3E}">
-        <p14:creationId xmlns:p14="http://schemas.microsoft.com/office/powerpoint/2010/main" xmlns="" val="3316016104"/>
+        <p14:creationId xmlns:p14="http://schemas.microsoft.com/office/powerpoint/2010/main" val="3316016104"/>
       </p:ext>
     </p:extLst>
   </p:cSld>
   <p:clrMapOvr>
     <a:masterClrMapping/>
   </p:clrMapOvr>
+  <p:timing>
+    <p:tnLst>
+      <p:par>
+        <p:cTn id="1" dur="indefinite" restart="never" nodeType="tmRoot"/>
+      </p:par>
+    </p:tnLst>
+  </p:timing>
 </p:sld>
 </file>
 
@@ -5936,9 +6036,27 @@
               <a:t>associados</a:t>
             </a:r>
             <a:r>
+              <a:rPr lang="en-US" dirty="0" smtClean="0"/>
+              <a:t>.</a:t>
+            </a:r>
+          </a:p>
+          <a:p>
+            <a:pPr marL="109728" indent="0">
+              <a:buNone/>
+            </a:pPr>
+            <a:r>
               <a:rPr lang="en-US" dirty="0"/>
-              <a:t>.</a:t>
-            </a:r>
+              <a:t>	</a:t>
+            </a:r>
+            <a:r>
+              <a:rPr lang="en-US" dirty="0" err="1" smtClean="0"/>
+              <a:t>Exemplo</a:t>
+            </a:r>
+            <a:r>
+              <a:rPr lang="en-US" dirty="0" smtClean="0"/>
+              <a:t>: aula_04_cod_1.ino</a:t>
+            </a:r>
+            <a:endParaRPr lang="en-US" dirty="0"/>
           </a:p>
         </p:txBody>
       </p:sp>
@@ -5996,13 +6114,20 @@
     </p:spTree>
     <p:extLst>
       <p:ext uri="{BB962C8B-B14F-4D97-AF65-F5344CB8AC3E}">
-        <p14:creationId xmlns:p14="http://schemas.microsoft.com/office/powerpoint/2010/main" xmlns="" val="891840609"/>
+        <p14:creationId xmlns:p14="http://schemas.microsoft.com/office/powerpoint/2010/main" val="891840609"/>
       </p:ext>
     </p:extLst>
   </p:cSld>
   <p:clrMapOvr>
     <a:masterClrMapping/>
   </p:clrMapOvr>
+  <p:timing>
+    <p:tnLst>
+      <p:par>
+        <p:cTn id="1" dur="indefinite" restart="never" nodeType="tmRoot"/>
+      </p:par>
+    </p:tnLst>
+  </p:timing>
 </p:sld>
 </file>
 
@@ -6222,53 +6347,49 @@
             </a:r>
             <a:r>
               <a:rPr lang="en-US" dirty="0" smtClean="0"/>
+              <a:t> o </a:t>
+            </a:r>
+            <a:r>
+              <a:rPr lang="en-US" dirty="0" err="1" smtClean="0"/>
+              <a:t>espaço</a:t>
+            </a:r>
+            <a:r>
+              <a:rPr lang="en-US" dirty="0" smtClean="0"/>
+              <a:t> de </a:t>
+            </a:r>
+            <a:r>
+              <a:rPr lang="en-US" dirty="0" err="1" smtClean="0"/>
+              <a:t>memória</a:t>
+            </a:r>
+            <a:r>
+              <a:rPr lang="en-US" dirty="0" smtClean="0"/>
+              <a:t> com o </a:t>
+            </a:r>
+            <a:r>
+              <a:rPr lang="en-US" dirty="0" err="1" smtClean="0"/>
+              <a:t>nome</a:t>
+            </a:r>
+            <a:r>
+              <a:rPr lang="en-US" dirty="0" smtClean="0"/>
+              <a:t> “</a:t>
+            </a:r>
+            <a:r>
+              <a:rPr lang="en-US" dirty="0" err="1" smtClean="0"/>
+              <a:t>remoto</a:t>
+            </a:r>
+            <a:r>
+              <a:rPr lang="en-US" dirty="0" smtClean="0"/>
+              <a:t>” e, </a:t>
+            </a:r>
+            <a:r>
+              <a:rPr lang="en-US" dirty="0" err="1" smtClean="0"/>
+              <a:t>ao</a:t>
+            </a:r>
+            <a:r>
+              <a:rPr lang="en-US" dirty="0" smtClean="0"/>
               <a:t> </a:t>
             </a:r>
             <a:r>
-              <a:rPr lang="en-US" dirty="0" smtClean="0"/>
-              <a:t>o </a:t>
-            </a:r>
-            <a:r>
-              <a:rPr lang="en-US" dirty="0" err="1" smtClean="0"/>
-              <a:t>espaço</a:t>
-            </a:r>
-            <a:r>
-              <a:rPr lang="en-US" dirty="0" smtClean="0"/>
-              <a:t> de </a:t>
-            </a:r>
-            <a:r>
-              <a:rPr lang="en-US" dirty="0" err="1" smtClean="0"/>
-              <a:t>memória</a:t>
-            </a:r>
-            <a:r>
-              <a:rPr lang="en-US" dirty="0" smtClean="0"/>
-              <a:t> com o </a:t>
-            </a:r>
-            <a:r>
-              <a:rPr lang="en-US" dirty="0" err="1" smtClean="0"/>
-              <a:t>nome</a:t>
-            </a:r>
-            <a:r>
-              <a:rPr lang="en-US" dirty="0" smtClean="0"/>
-              <a:t> “</a:t>
-            </a:r>
-            <a:r>
-              <a:rPr lang="en-US" dirty="0" err="1" smtClean="0"/>
-              <a:t>remoto</a:t>
-            </a:r>
-            <a:r>
-              <a:rPr lang="en-US" dirty="0" smtClean="0"/>
-              <a:t>” e, </a:t>
-            </a:r>
-            <a:r>
-              <a:rPr lang="en-US" dirty="0" err="1" smtClean="0"/>
-              <a:t>ao</a:t>
-            </a:r>
-            <a:r>
-              <a:rPr lang="en-US" dirty="0" smtClean="0"/>
-              <a:t> </a:t>
-            </a:r>
-            <a:r>
               <a:rPr lang="en-US" dirty="0" err="1" smtClean="0"/>
               <a:t>mesmo</a:t>
             </a:r>
@@ -6282,11 +6403,7 @@
             </a:r>
             <a:r>
               <a:rPr lang="en-US" dirty="0" smtClean="0"/>
-              <a:t> </a:t>
-            </a:r>
-            <a:r>
-              <a:rPr lang="en-US" dirty="0" smtClean="0"/>
-              <a:t>o valor de </a:t>
+              <a:t> o valor de </a:t>
             </a:r>
             <a:r>
               <a:rPr lang="en-US" dirty="0" err="1" smtClean="0"/>
@@ -6340,15 +6457,19 @@
             </a:r>
             <a:r>
               <a:rPr lang="en-US" dirty="0" smtClean="0"/>
+              <a:t> o valor </a:t>
+            </a:r>
+            <a:r>
+              <a:rPr lang="en-US" dirty="0" err="1" smtClean="0"/>
+              <a:t>armazenado</a:t>
+            </a:r>
+            <a:r>
+              <a:rPr lang="en-US" dirty="0" smtClean="0"/>
               <a:t> </a:t>
             </a:r>
             <a:r>
-              <a:rPr lang="en-US" dirty="0" smtClean="0"/>
-              <a:t>o valor </a:t>
-            </a:r>
-            <a:r>
-              <a:rPr lang="en-US" dirty="0" err="1" smtClean="0"/>
-              <a:t>armazenado</a:t>
+              <a:rPr lang="en-US" dirty="0" err="1" smtClean="0"/>
+              <a:t>em</a:t>
             </a:r>
             <a:r>
               <a:rPr lang="en-US" dirty="0" smtClean="0"/>
@@ -6356,7 +6477,7 @@
             </a:r>
             <a:r>
               <a:rPr lang="en-US" dirty="0" err="1" smtClean="0"/>
-              <a:t>em</a:t>
+              <a:t>na</a:t>
             </a:r>
             <a:r>
               <a:rPr lang="en-US" dirty="0" smtClean="0"/>
@@ -6364,14 +6485,6 @@
             </a:r>
             <a:r>
               <a:rPr lang="en-US" dirty="0" err="1" smtClean="0"/>
-              <a:t>na</a:t>
-            </a:r>
-            <a:r>
-              <a:rPr lang="en-US" dirty="0" smtClean="0"/>
-              <a:t> </a:t>
-            </a:r>
-            <a:r>
-              <a:rPr lang="en-US" dirty="0" err="1" smtClean="0"/>
               <a:t>variável</a:t>
             </a:r>
             <a:r>
@@ -6386,7 +6499,6 @@
               <a:rPr lang="en-US" dirty="0" smtClean="0"/>
               <a:t>”)</a:t>
             </a:r>
-            <a:endParaRPr lang="en-US" dirty="0" smtClean="0"/>
           </a:p>
           <a:p>
             <a:pPr marL="109728" indent="0">
@@ -6446,13 +6558,20 @@
     </p:spTree>
     <p:extLst>
       <p:ext uri="{BB962C8B-B14F-4D97-AF65-F5344CB8AC3E}">
-        <p14:creationId xmlns:p14="http://schemas.microsoft.com/office/powerpoint/2010/main" xmlns="" val="821862138"/>
+        <p14:creationId xmlns:p14="http://schemas.microsoft.com/office/powerpoint/2010/main" val="821862138"/>
       </p:ext>
     </p:extLst>
   </p:cSld>
   <p:clrMapOvr>
     <a:masterClrMapping/>
   </p:clrMapOvr>
+  <p:timing>
+    <p:tnLst>
+      <p:par>
+        <p:cTn id="1" dur="indefinite" restart="never" nodeType="tmRoot"/>
+      </p:par>
+    </p:tnLst>
+  </p:timing>
 </p:sld>
 </file>
 
@@ -6688,13 +6807,20 @@
     </p:spTree>
     <p:extLst>
       <p:ext uri="{BB962C8B-B14F-4D97-AF65-F5344CB8AC3E}">
-        <p14:creationId xmlns:p14="http://schemas.microsoft.com/office/powerpoint/2010/main" xmlns="" val="399895805"/>
+        <p14:creationId xmlns:p14="http://schemas.microsoft.com/office/powerpoint/2010/main" val="399895805"/>
       </p:ext>
     </p:extLst>
   </p:cSld>
   <p:clrMapOvr>
     <a:masterClrMapping/>
   </p:clrMapOvr>
+  <p:timing>
+    <p:tnLst>
+      <p:par>
+        <p:cTn id="1" dur="indefinite" restart="never" nodeType="tmRoot"/>
+      </p:par>
+    </p:tnLst>
+  </p:timing>
 </p:sld>
 </file>
 
@@ -6760,11 +6886,7 @@
             </a:r>
             <a:r>
               <a:rPr lang="en-US" dirty="0" smtClean="0"/>
-              <a:t> a </a:t>
-            </a:r>
-            <a:r>
-              <a:rPr lang="en-US" dirty="0" smtClean="0"/>
-              <a:t>seta </a:t>
+              <a:t> a seta </a:t>
             </a:r>
             <a:r>
               <a:rPr lang="en-US" dirty="0" err="1" smtClean="0"/>
@@ -6812,11 +6934,7 @@
             </a:r>
             <a:r>
               <a:rPr lang="en-US" dirty="0" smtClean="0"/>
-              <a:t> 21</a:t>
-            </a:r>
-            <a:r>
-              <a:rPr lang="en-US" dirty="0" smtClean="0"/>
-              <a:t>), o </a:t>
+              <a:t> 21), o </a:t>
             </a:r>
             <a:r>
               <a:rPr lang="en-US" dirty="0" err="1" smtClean="0"/>
@@ -6880,15 +6998,7 @@
             </a:r>
             <a:r>
               <a:rPr lang="en-US" dirty="0" smtClean="0"/>
-              <a:t>. SE o valor </a:t>
-            </a:r>
-            <a:r>
-              <a:rPr lang="en-US" dirty="0" err="1" smtClean="0"/>
-              <a:t>que</a:t>
-            </a:r>
-            <a:r>
-              <a:rPr lang="en-US" dirty="0" smtClean="0"/>
-              <a:t> o </a:t>
+              <a:t>. SE o valor que o </a:t>
             </a:r>
             <a:r>
               <a:rPr lang="en-US" dirty="0" err="1" smtClean="0"/>
@@ -6912,11 +7022,7 @@
             </a:r>
             <a:r>
               <a:rPr lang="en-US" dirty="0" smtClean="0"/>
-              <a:t> a -</a:t>
-            </a:r>
-            <a:r>
-              <a:rPr lang="en-US" dirty="0" smtClean="0"/>
-              <a:t>1, o </a:t>
+              <a:t> a -1, o </a:t>
             </a:r>
             <a:r>
               <a:rPr lang="en-US" dirty="0" err="1" smtClean="0"/>
@@ -6942,6 +7048,28 @@
               <a:rPr lang="en-US" dirty="0" smtClean="0"/>
               <a:t>.</a:t>
             </a:r>
+          </a:p>
+          <a:p>
+            <a:endParaRPr lang="en-US" dirty="0"/>
+          </a:p>
+          <a:p>
+            <a:r>
+              <a:rPr lang="en-US" dirty="0" err="1" smtClean="0"/>
+              <a:t>Solução</a:t>
+            </a:r>
+            <a:r>
+              <a:rPr lang="en-US" dirty="0" smtClean="0"/>
+              <a:t> </a:t>
+            </a:r>
+            <a:r>
+              <a:rPr lang="en-US" dirty="0" err="1" smtClean="0"/>
+              <a:t>proposta</a:t>
+            </a:r>
+            <a:r>
+              <a:rPr lang="en-US" dirty="0" smtClean="0"/>
+              <a:t>: aula_04_cod_2.ino</a:t>
+            </a:r>
+            <a:endParaRPr lang="en-US" dirty="0" smtClean="0"/>
           </a:p>
           <a:p>
             <a:endParaRPr lang="en-US" dirty="0"/>
@@ -7002,13 +7130,20 @@
     </p:spTree>
     <p:extLst>
       <p:ext uri="{BB962C8B-B14F-4D97-AF65-F5344CB8AC3E}">
-        <p14:creationId xmlns:p14="http://schemas.microsoft.com/office/powerpoint/2010/main" xmlns="" val="1244723364"/>
+        <p14:creationId xmlns:p14="http://schemas.microsoft.com/office/powerpoint/2010/main" val="1244723364"/>
       </p:ext>
     </p:extLst>
   </p:cSld>
   <p:clrMapOvr>
     <a:masterClrMapping/>
   </p:clrMapOvr>
+  <p:timing>
+    <p:tnLst>
+      <p:par>
+        <p:cTn id="1" dur="indefinite" restart="never" nodeType="tmRoot"/>
+      </p:par>
+    </p:tnLst>
+  </p:timing>
 </p:sld>
 </file>
 
@@ -7368,13 +7503,20 @@
     </p:spTree>
     <p:extLst>
       <p:ext uri="{BB962C8B-B14F-4D97-AF65-F5344CB8AC3E}">
-        <p14:creationId xmlns:p14="http://schemas.microsoft.com/office/powerpoint/2010/main" xmlns="" val="901686543"/>
+        <p14:creationId xmlns:p14="http://schemas.microsoft.com/office/powerpoint/2010/main" val="901686543"/>
       </p:ext>
     </p:extLst>
   </p:cSld>
   <p:clrMapOvr>
     <a:masterClrMapping/>
   </p:clrMapOvr>
+  <p:timing>
+    <p:tnLst>
+      <p:par>
+        <p:cTn id="1" dur="indefinite" restart="never" nodeType="tmRoot"/>
+      </p:par>
+    </p:tnLst>
+  </p:timing>
 </p:sld>
 </file>
 

</xml_diff>

<commit_message>
Added Class 05 and changed some stuff
</commit_message>
<xml_diff>
--- a/Aula 04/Aula 04.pptx
+++ b/Aula 04/Aula 04.pptx
@@ -15,6 +15,7 @@
     <p:sldId id="260" r:id="rId9"/>
     <p:sldId id="263" r:id="rId10"/>
     <p:sldId id="265" r:id="rId11"/>
+    <p:sldId id="266" r:id="rId12"/>
   </p:sldIdLst>
   <p:sldSz cx="9144000" cy="6858000" type="screen4x3"/>
   <p:notesSz cx="6858000" cy="9144000"/>
@@ -5059,6 +5060,98 @@
 </p:sld>
 </file>
 
+<file path=ppt/slides/slide11.xml><?xml version="1.0" encoding="utf-8"?>
+<p:sld xmlns:a="http://schemas.openxmlformats.org/drawingml/2006/main" xmlns:r="http://schemas.openxmlformats.org/officeDocument/2006/relationships" xmlns:p="http://schemas.openxmlformats.org/presentationml/2006/main">
+  <p:cSld>
+    <p:spTree>
+      <p:nvGrpSpPr>
+        <p:cNvPr id="1" name=""/>
+        <p:cNvGrpSpPr/>
+        <p:nvPr/>
+      </p:nvGrpSpPr>
+      <p:grpSpPr>
+        <a:xfrm>
+          <a:off x="0" y="0"/>
+          <a:ext cx="0" cy="0"/>
+          <a:chOff x="0" y="0"/>
+          <a:chExt cx="0" cy="0"/>
+        </a:xfrm>
+      </p:grpSpPr>
+      <p:sp>
+        <p:nvSpPr>
+          <p:cNvPr id="2" name="Espaço Reservado para Conteúdo 1"/>
+          <p:cNvSpPr>
+            <a:spLocks noGrp="1"/>
+          </p:cNvSpPr>
+          <p:nvPr>
+            <p:ph idx="1"/>
+          </p:nvPr>
+        </p:nvSpPr>
+        <p:spPr/>
+        <p:txBody>
+          <a:bodyPr/>
+          <a:lstStyle/>
+          <a:p>
+            <a:endParaRPr lang="pt-BR" dirty="0" smtClean="0"/>
+          </a:p>
+          <a:p>
+            <a:endParaRPr lang="pt-BR" dirty="0"/>
+          </a:p>
+          <a:p>
+            <a:endParaRPr lang="pt-BR" dirty="0" smtClean="0"/>
+          </a:p>
+          <a:p>
+            <a:r>
+              <a:rPr lang="pt-BR" dirty="0" smtClean="0"/>
+              <a:t>Seguindo linhas!</a:t>
+            </a:r>
+            <a:endParaRPr lang="pt-BR" dirty="0"/>
+          </a:p>
+        </p:txBody>
+      </p:sp>
+      <p:sp>
+        <p:nvSpPr>
+          <p:cNvPr id="3" name="Título 2"/>
+          <p:cNvSpPr>
+            <a:spLocks noGrp="1"/>
+          </p:cNvSpPr>
+          <p:nvPr>
+            <p:ph type="title"/>
+          </p:nvPr>
+        </p:nvSpPr>
+        <p:spPr/>
+        <p:txBody>
+          <a:bodyPr/>
+          <a:lstStyle/>
+          <a:p>
+            <a:r>
+              <a:rPr lang="pt-BR" dirty="0" smtClean="0"/>
+              <a:t>Próxima aula...</a:t>
+            </a:r>
+            <a:endParaRPr lang="pt-BR" dirty="0"/>
+          </a:p>
+        </p:txBody>
+      </p:sp>
+    </p:spTree>
+    <p:extLst>
+      <p:ext uri="{BB962C8B-B14F-4D97-AF65-F5344CB8AC3E}">
+        <p14:creationId xmlns:p14="http://schemas.microsoft.com/office/powerpoint/2010/main" val="2911253465"/>
+      </p:ext>
+    </p:extLst>
+  </p:cSld>
+  <p:clrMapOvr>
+    <a:masterClrMapping/>
+  </p:clrMapOvr>
+  <p:timing>
+    <p:tnLst>
+      <p:par>
+        <p:cTn id="1" dur="indefinite" restart="never" nodeType="tmRoot"/>
+      </p:par>
+    </p:tnLst>
+  </p:timing>
+</p:sld>
+</file>
+
 <file path=ppt/slides/slide2.xml><?xml version="1.0" encoding="utf-8"?>
 <p:sld xmlns:a="http://schemas.openxmlformats.org/drawingml/2006/main" xmlns:r="http://schemas.openxmlformats.org/officeDocument/2006/relationships" xmlns:p="http://schemas.openxmlformats.org/presentationml/2006/main">
   <p:cSld>
@@ -7069,7 +7162,6 @@
               <a:rPr lang="en-US" dirty="0" smtClean="0"/>
               <a:t>: aula_04_cod_2.ino</a:t>
             </a:r>
-            <a:endParaRPr lang="en-US" dirty="0" smtClean="0"/>
           </a:p>
           <a:p>
             <a:endParaRPr lang="en-US" dirty="0"/>

</xml_diff>